<commit_message>
PID and risk assessments scans
</commit_message>
<xml_diff>
--- a/Indicater Placement Reports/Indicater Presentation.pptx
+++ b/Indicater Placement Reports/Indicater Presentation.pptx
@@ -110,6 +110,22 @@
       </a:defRPr>
     </a:lvl9pPr>
   </p:defaultTextStyle>
+  <p:extLst>
+    <p:ext uri="{EFAFB233-063F-42B5-8137-9DF3F51BA10A}">
+      <p15:sldGuideLst xmlns:p15="http://schemas.microsoft.com/office/powerpoint/2012/main">
+        <p15:guide id="1" orient="horz" pos="2160">
+          <p15:clr>
+            <a:srgbClr val="A4A3A4"/>
+          </p15:clr>
+        </p15:guide>
+        <p15:guide id="2" pos="3840">
+          <p15:clr>
+            <a:srgbClr val="A4A3A4"/>
+          </p15:clr>
+        </p15:guide>
+      </p15:sldGuideLst>
+    </p:ext>
+  </p:extLst>
 </p:presentation>
 </file>
 
@@ -244,7 +260,7 @@
           <a:p>
             <a:fld id="{C2524447-275C-4CDC-8907-91F2919F9572}" type="datetimeFigureOut">
               <a:rPr lang="en-GB" smtClean="0"/>
-              <a:t>07/10/2015</a:t>
+              <a:t>08/10/2015</a:t>
             </a:fld>
             <a:endParaRPr lang="en-GB"/>
           </a:p>
@@ -414,7 +430,7 @@
           <a:p>
             <a:fld id="{C2524447-275C-4CDC-8907-91F2919F9572}" type="datetimeFigureOut">
               <a:rPr lang="en-GB" smtClean="0"/>
-              <a:t>07/10/2015</a:t>
+              <a:t>08/10/2015</a:t>
             </a:fld>
             <a:endParaRPr lang="en-GB"/>
           </a:p>
@@ -594,7 +610,7 @@
           <a:p>
             <a:fld id="{C2524447-275C-4CDC-8907-91F2919F9572}" type="datetimeFigureOut">
               <a:rPr lang="en-GB" smtClean="0"/>
-              <a:t>07/10/2015</a:t>
+              <a:t>08/10/2015</a:t>
             </a:fld>
             <a:endParaRPr lang="en-GB"/>
           </a:p>
@@ -764,7 +780,7 @@
           <a:p>
             <a:fld id="{C2524447-275C-4CDC-8907-91F2919F9572}" type="datetimeFigureOut">
               <a:rPr lang="en-GB" smtClean="0"/>
-              <a:t>07/10/2015</a:t>
+              <a:t>08/10/2015</a:t>
             </a:fld>
             <a:endParaRPr lang="en-GB"/>
           </a:p>
@@ -1010,7 +1026,7 @@
           <a:p>
             <a:fld id="{C2524447-275C-4CDC-8907-91F2919F9572}" type="datetimeFigureOut">
               <a:rPr lang="en-GB" smtClean="0"/>
-              <a:t>07/10/2015</a:t>
+              <a:t>08/10/2015</a:t>
             </a:fld>
             <a:endParaRPr lang="en-GB"/>
           </a:p>
@@ -1242,7 +1258,7 @@
           <a:p>
             <a:fld id="{C2524447-275C-4CDC-8907-91F2919F9572}" type="datetimeFigureOut">
               <a:rPr lang="en-GB" smtClean="0"/>
-              <a:t>07/10/2015</a:t>
+              <a:t>08/10/2015</a:t>
             </a:fld>
             <a:endParaRPr lang="en-GB"/>
           </a:p>
@@ -1609,7 +1625,7 @@
           <a:p>
             <a:fld id="{C2524447-275C-4CDC-8907-91F2919F9572}" type="datetimeFigureOut">
               <a:rPr lang="en-GB" smtClean="0"/>
-              <a:t>07/10/2015</a:t>
+              <a:t>08/10/2015</a:t>
             </a:fld>
             <a:endParaRPr lang="en-GB"/>
           </a:p>
@@ -1727,7 +1743,7 @@
           <a:p>
             <a:fld id="{C2524447-275C-4CDC-8907-91F2919F9572}" type="datetimeFigureOut">
               <a:rPr lang="en-GB" smtClean="0"/>
-              <a:t>07/10/2015</a:t>
+              <a:t>08/10/2015</a:t>
             </a:fld>
             <a:endParaRPr lang="en-GB"/>
           </a:p>
@@ -1822,7 +1838,7 @@
           <a:p>
             <a:fld id="{C2524447-275C-4CDC-8907-91F2919F9572}" type="datetimeFigureOut">
               <a:rPr lang="en-GB" smtClean="0"/>
-              <a:t>07/10/2015</a:t>
+              <a:t>08/10/2015</a:t>
             </a:fld>
             <a:endParaRPr lang="en-GB"/>
           </a:p>
@@ -2099,7 +2115,7 @@
           <a:p>
             <a:fld id="{C2524447-275C-4CDC-8907-91F2919F9572}" type="datetimeFigureOut">
               <a:rPr lang="en-GB" smtClean="0"/>
-              <a:t>07/10/2015</a:t>
+              <a:t>08/10/2015</a:t>
             </a:fld>
             <a:endParaRPr lang="en-GB"/>
           </a:p>
@@ -2352,7 +2368,7 @@
           <a:p>
             <a:fld id="{C2524447-275C-4CDC-8907-91F2919F9572}" type="datetimeFigureOut">
               <a:rPr lang="en-GB" smtClean="0"/>
-              <a:t>07/10/2015</a:t>
+              <a:t>08/10/2015</a:t>
             </a:fld>
             <a:endParaRPr lang="en-GB"/>
           </a:p>
@@ -2565,7 +2581,7 @@
           <a:p>
             <a:fld id="{C2524447-275C-4CDC-8907-91F2919F9572}" type="datetimeFigureOut">
               <a:rPr lang="en-GB" smtClean="0"/>
-              <a:t>07/10/2015</a:t>
+              <a:t>08/10/2015</a:t>
             </a:fld>
             <a:endParaRPr lang="en-GB"/>
           </a:p>
@@ -3340,8 +3356,8 @@
         </p:nvSpPr>
         <p:spPr>
           <a:xfrm>
-            <a:off x="731521" y="3964408"/>
-            <a:ext cx="6940732" cy="2031325"/>
+            <a:off x="575248" y="3776689"/>
+            <a:ext cx="6940732" cy="2270109"/>
           </a:xfrm>
           <a:prstGeom prst="rect">
             <a:avLst/>
@@ -3363,7 +3379,7 @@
               </a:buBlip>
             </a:pPr>
             <a:r>
-              <a:rPr lang="en-GB" sz="1400" dirty="0" smtClean="0"/>
+              <a:rPr lang="en-GB" sz="1600" dirty="0" smtClean="0"/>
               <a:t>Based in Henley</a:t>
             </a:r>
           </a:p>
@@ -3377,7 +3393,7 @@
               </a:buBlip>
             </a:pPr>
             <a:r>
-              <a:rPr lang="en-GB" sz="1400" dirty="0" smtClean="0"/>
+              <a:rPr lang="en-GB" sz="1600" dirty="0" smtClean="0"/>
               <a:t>Established in 2000 by mike day and Lou Wilcock</a:t>
             </a:r>
           </a:p>
@@ -3391,18 +3407,18 @@
               </a:buBlip>
             </a:pPr>
             <a:r>
-              <a:rPr lang="en-GB" sz="1400" dirty="0" smtClean="0"/>
+              <a:rPr lang="en-GB" sz="1600" dirty="0" smtClean="0"/>
               <a:t>Delivers </a:t>
             </a:r>
             <a:r>
-              <a:rPr lang="en-GB" sz="1400" dirty="0"/>
+              <a:rPr lang="en-GB" sz="1600" dirty="0"/>
               <a:t>business management solutions for the hospitality </a:t>
             </a:r>
             <a:r>
-              <a:rPr lang="en-GB" sz="1400" dirty="0" smtClean="0"/>
+              <a:rPr lang="en-GB" sz="1600" dirty="0" smtClean="0"/>
               <a:t>industry</a:t>
             </a:r>
-            <a:endParaRPr lang="en-GB" sz="1400" dirty="0"/>
+            <a:endParaRPr lang="en-GB" sz="1600" dirty="0"/>
           </a:p>
           <a:p>
             <a:pPr marL="285750" indent="-285750">
@@ -3414,7 +3430,7 @@
               </a:buBlip>
             </a:pPr>
             <a:r>
-              <a:rPr lang="en-GB" sz="1400" dirty="0" smtClean="0"/>
+              <a:rPr lang="en-GB" sz="1600" dirty="0" smtClean="0"/>
               <a:t>Provides web-based back of house online management systems for business operations such as payroll, sales, patient dining, online booking</a:t>
             </a:r>
           </a:p>
@@ -3428,7 +3444,7 @@
               </a:buBlip>
             </a:pPr>
             <a:r>
-              <a:rPr lang="en-GB" sz="1400" dirty="0" smtClean="0"/>
+              <a:rPr lang="en-GB" sz="1600" dirty="0" smtClean="0"/>
               <a:t>Offering over 30 modules of critical business management tools</a:t>
             </a:r>
           </a:p>
@@ -3442,7 +3458,7 @@
         </p:nvSpPr>
         <p:spPr>
           <a:xfrm>
-            <a:off x="1402783" y="1598153"/>
+            <a:off x="1203750" y="1385270"/>
             <a:ext cx="1193074" cy="584775"/>
           </a:xfrm>
           <a:prstGeom prst="rect">
@@ -3479,7 +3495,7 @@
         </p:nvSpPr>
         <p:spPr>
           <a:xfrm>
-            <a:off x="3071950" y="1600981"/>
+            <a:off x="4098624" y="1623719"/>
             <a:ext cx="1319347" cy="738664"/>
           </a:xfrm>
           <a:prstGeom prst="rect">
@@ -3532,7 +3548,7 @@
         </p:blipFill>
         <p:spPr bwMode="auto">
           <a:xfrm>
-            <a:off x="1348357" y="2252617"/>
+            <a:off x="1149324" y="2064898"/>
             <a:ext cx="1301926" cy="1711791"/>
           </a:xfrm>
           <a:prstGeom prst="rect">
@@ -3573,7 +3589,7 @@
         </p:blipFill>
         <p:spPr bwMode="auto">
           <a:xfrm>
-            <a:off x="3089372" y="2354101"/>
+            <a:off x="4061620" y="2399345"/>
             <a:ext cx="1301925" cy="1711791"/>
           </a:xfrm>
           <a:prstGeom prst="rect">
@@ -3838,7 +3854,7 @@
         <p:spPr>
           <a:xfrm>
             <a:off x="740231" y="2021839"/>
-            <a:ext cx="5625736" cy="738664"/>
+            <a:ext cx="5625736" cy="830997"/>
           </a:xfrm>
           <a:prstGeom prst="rect">
             <a:avLst/>
@@ -3860,7 +3876,7 @@
               </a:buBlip>
             </a:pPr>
             <a:r>
-              <a:rPr lang="en-GB" sz="1400" dirty="0" smtClean="0"/>
+              <a:rPr lang="en-GB" sz="1600" dirty="0" smtClean="0"/>
               <a:t>Providing software solutions for over 2500+ outlets</a:t>
             </a:r>
           </a:p>
@@ -3874,7 +3890,7 @@
               </a:buBlip>
             </a:pPr>
             <a:r>
-              <a:rPr lang="en-GB" sz="1400" dirty="0" smtClean="0"/>
+              <a:rPr lang="en-GB" sz="1600" dirty="0" smtClean="0"/>
               <a:t>Good business relations in hospitality industry</a:t>
             </a:r>
           </a:p>
@@ -4751,6 +4767,158 @@
           </a:p>
         </p:txBody>
       </p:sp>
+      <p:sp>
+        <p:nvSpPr>
+          <p:cNvPr id="3" name="TextBox 2"/>
+          <p:cNvSpPr txBox="1"/>
+          <p:nvPr/>
+        </p:nvSpPr>
+        <p:spPr>
+          <a:xfrm>
+            <a:off x="750626" y="2296951"/>
+            <a:ext cx="6594498" cy="3000821"/>
+          </a:xfrm>
+          <a:prstGeom prst="rect">
+            <a:avLst/>
+          </a:prstGeom>
+          <a:noFill/>
+        </p:spPr>
+        <p:txBody>
+          <a:bodyPr wrap="none" rtlCol="0">
+            <a:spAutoFit/>
+          </a:bodyPr>
+          <a:lstStyle/>
+          <a:p>
+            <a:pPr marL="285750" indent="-285750">
+              <a:lnSpc>
+                <a:spcPct val="150000"/>
+              </a:lnSpc>
+              <a:buBlip>
+                <a:blip r:embed="rId3"/>
+              </a:buBlip>
+            </a:pPr>
+            <a:r>
+              <a:rPr lang="en-GB" dirty="0" smtClean="0"/>
+              <a:t>Worked within a small team of developers and a project manager</a:t>
+            </a:r>
+          </a:p>
+          <a:p>
+            <a:pPr marL="285750" indent="-285750">
+              <a:lnSpc>
+                <a:spcPct val="150000"/>
+              </a:lnSpc>
+              <a:buBlip>
+                <a:blip r:embed="rId3"/>
+              </a:buBlip>
+            </a:pPr>
+            <a:r>
+              <a:rPr lang="en-GB" dirty="0" smtClean="0"/>
+              <a:t>Main roles involved testing bug fixes and developments</a:t>
+            </a:r>
+          </a:p>
+          <a:p>
+            <a:pPr marL="285750" indent="-285750">
+              <a:lnSpc>
+                <a:spcPct val="150000"/>
+              </a:lnSpc>
+              <a:buBlip>
+                <a:blip r:embed="rId3"/>
+              </a:buBlip>
+            </a:pPr>
+            <a:r>
+              <a:rPr lang="en-GB" dirty="0" smtClean="0"/>
+              <a:t>Monthly software releases</a:t>
+            </a:r>
+          </a:p>
+          <a:p>
+            <a:pPr marL="285750" indent="-285750">
+              <a:lnSpc>
+                <a:spcPct val="150000"/>
+              </a:lnSpc>
+              <a:buBlip>
+                <a:blip r:embed="rId3"/>
+              </a:buBlip>
+            </a:pPr>
+            <a:r>
+              <a:rPr lang="en-GB" dirty="0" smtClean="0"/>
+              <a:t>Develop and manage test and integration environments</a:t>
+            </a:r>
+          </a:p>
+          <a:p>
+            <a:pPr marL="285750" indent="-285750">
+              <a:lnSpc>
+                <a:spcPct val="150000"/>
+              </a:lnSpc>
+              <a:buBlip>
+                <a:blip r:embed="rId3"/>
+              </a:buBlip>
+            </a:pPr>
+            <a:r>
+              <a:rPr lang="en-GB" dirty="0" smtClean="0"/>
+              <a:t>Documenting system status</a:t>
+            </a:r>
+          </a:p>
+          <a:p>
+            <a:pPr marL="285750" indent="-285750">
+              <a:lnSpc>
+                <a:spcPct val="150000"/>
+              </a:lnSpc>
+              <a:buBlip>
+                <a:blip r:embed="rId3"/>
+              </a:buBlip>
+            </a:pPr>
+            <a:r>
+              <a:rPr lang="en-GB" dirty="0" smtClean="0"/>
+              <a:t>Sprint planning and scrum meetings</a:t>
+            </a:r>
+          </a:p>
+          <a:p>
+            <a:pPr marL="285750" indent="-285750">
+              <a:lnSpc>
+                <a:spcPct val="150000"/>
+              </a:lnSpc>
+              <a:buBlip>
+                <a:blip r:embed="rId3"/>
+              </a:buBlip>
+            </a:pPr>
+            <a:r>
+              <a:rPr lang="en-GB" dirty="0" smtClean="0"/>
+              <a:t>System handover to new junior tester</a:t>
+            </a:r>
+            <a:endParaRPr lang="en-GB" dirty="0"/>
+          </a:p>
+        </p:txBody>
+      </p:sp>
+      <p:pic>
+        <p:nvPicPr>
+          <p:cNvPr id="7" name="Picture 6"/>
+          <p:cNvPicPr>
+            <a:picLocks noChangeAspect="1"/>
+          </p:cNvPicPr>
+          <p:nvPr/>
+        </p:nvPicPr>
+        <p:blipFill>
+          <a:blip r:embed="rId4">
+            <a:extLst>
+              <a:ext uri="{28A0092B-C50C-407E-A947-70E740481C1C}">
+                <a14:useLocalDpi xmlns:a14="http://schemas.microsoft.com/office/drawing/2010/main" val="0"/>
+              </a:ext>
+            </a:extLst>
+          </a:blip>
+          <a:stretch>
+            <a:fillRect/>
+          </a:stretch>
+        </p:blipFill>
+        <p:spPr>
+          <a:xfrm>
+            <a:off x="8330267" y="4258039"/>
+            <a:ext cx="2447556" cy="1533239"/>
+          </a:xfrm>
+          <a:prstGeom prst="rect">
+            <a:avLst/>
+          </a:prstGeom>
+        </p:spPr>
+      </p:pic>
     </p:spTree>
     <p:extLst>
       <p:ext uri="{BB962C8B-B14F-4D97-AF65-F5344CB8AC3E}">
@@ -4948,6 +5116,239 @@
           </a:p>
         </p:txBody>
       </p:sp>
+      <p:sp>
+        <p:nvSpPr>
+          <p:cNvPr id="3" name="TextBox 2"/>
+          <p:cNvSpPr txBox="1"/>
+          <p:nvPr/>
+        </p:nvSpPr>
+        <p:spPr>
+          <a:xfrm>
+            <a:off x="908591" y="2240646"/>
+            <a:ext cx="4104650" cy="3093154"/>
+          </a:xfrm>
+          <a:prstGeom prst="rect">
+            <a:avLst/>
+          </a:prstGeom>
+          <a:noFill/>
+        </p:spPr>
+        <p:txBody>
+          <a:bodyPr wrap="none" rtlCol="0">
+            <a:spAutoFit/>
+          </a:bodyPr>
+          <a:lstStyle/>
+          <a:p>
+            <a:r>
+              <a:rPr lang="en-GB" sz="2400" dirty="0" smtClean="0"/>
+              <a:t>Tools Developed</a:t>
+            </a:r>
+          </a:p>
+          <a:p>
+            <a:endParaRPr lang="en-GB" dirty="0" smtClean="0"/>
+          </a:p>
+          <a:p>
+            <a:pPr marL="285750" indent="-285750">
+              <a:lnSpc>
+                <a:spcPct val="150000"/>
+              </a:lnSpc>
+              <a:buBlip>
+                <a:blip r:embed="rId3"/>
+              </a:buBlip>
+            </a:pPr>
+            <a:r>
+              <a:rPr lang="en-GB" dirty="0" smtClean="0"/>
+              <a:t>Deployment program</a:t>
+            </a:r>
+          </a:p>
+          <a:p>
+            <a:pPr marL="285750" indent="-285750">
+              <a:lnSpc>
+                <a:spcPct val="150000"/>
+              </a:lnSpc>
+              <a:buBlip>
+                <a:blip r:embed="rId3"/>
+              </a:buBlip>
+            </a:pPr>
+            <a:r>
+              <a:rPr lang="en-GB" dirty="0" smtClean="0"/>
+              <a:t>Zip program</a:t>
+            </a:r>
+          </a:p>
+          <a:p>
+            <a:pPr marL="285750" indent="-285750">
+              <a:lnSpc>
+                <a:spcPct val="150000"/>
+              </a:lnSpc>
+              <a:buBlip>
+                <a:blip r:embed="rId3"/>
+              </a:buBlip>
+            </a:pPr>
+            <a:r>
+              <a:rPr lang="en-GB" dirty="0" smtClean="0"/>
+              <a:t>File time stamp refresher</a:t>
+            </a:r>
+          </a:p>
+          <a:p>
+            <a:pPr marL="285750" indent="-285750">
+              <a:lnSpc>
+                <a:spcPct val="150000"/>
+              </a:lnSpc>
+              <a:buBlip>
+                <a:blip r:embed="rId3"/>
+              </a:buBlip>
+            </a:pPr>
+            <a:r>
+              <a:rPr lang="en-GB" dirty="0" smtClean="0"/>
+              <a:t>Git commit analyser</a:t>
+            </a:r>
+          </a:p>
+          <a:p>
+            <a:pPr marL="285750" indent="-285750">
+              <a:lnSpc>
+                <a:spcPct val="150000"/>
+              </a:lnSpc>
+              <a:buBlip>
+                <a:blip r:embed="rId3"/>
+              </a:buBlip>
+            </a:pPr>
+            <a:r>
+              <a:rPr lang="en-GB" dirty="0" smtClean="0"/>
+              <a:t>Automated browser testing (Selenium)</a:t>
+            </a:r>
+            <a:endParaRPr lang="en-GB" dirty="0"/>
+          </a:p>
+          <a:p>
+            <a:endParaRPr lang="en-GB" dirty="0"/>
+          </a:p>
+        </p:txBody>
+      </p:sp>
+      <p:sp>
+        <p:nvSpPr>
+          <p:cNvPr id="7" name="TextBox 6"/>
+          <p:cNvSpPr txBox="1"/>
+          <p:nvPr/>
+        </p:nvSpPr>
+        <p:spPr>
+          <a:xfrm>
+            <a:off x="5298971" y="2240646"/>
+            <a:ext cx="6280053" cy="4201150"/>
+          </a:xfrm>
+          <a:prstGeom prst="rect">
+            <a:avLst/>
+          </a:prstGeom>
+          <a:noFill/>
+        </p:spPr>
+        <p:txBody>
+          <a:bodyPr wrap="none" rtlCol="0">
+            <a:spAutoFit/>
+          </a:bodyPr>
+          <a:lstStyle/>
+          <a:p>
+            <a:r>
+              <a:rPr lang="en-GB" sz="2400" dirty="0" smtClean="0"/>
+              <a:t>Company Development</a:t>
+            </a:r>
+          </a:p>
+          <a:p>
+            <a:endParaRPr lang="en-GB" dirty="0"/>
+          </a:p>
+          <a:p>
+            <a:pPr marL="285750" indent="-285750">
+              <a:lnSpc>
+                <a:spcPct val="150000"/>
+              </a:lnSpc>
+              <a:buBlip>
+                <a:blip r:embed="rId3"/>
+              </a:buBlip>
+            </a:pPr>
+            <a:r>
+              <a:rPr lang="en-GB" dirty="0" smtClean="0"/>
+              <a:t>Developed the testing department. Doubled in size</a:t>
+            </a:r>
+          </a:p>
+          <a:p>
+            <a:pPr marL="285750" indent="-285750">
+              <a:lnSpc>
+                <a:spcPct val="150000"/>
+              </a:lnSpc>
+              <a:buBlip>
+                <a:blip r:embed="rId3"/>
+              </a:buBlip>
+            </a:pPr>
+            <a:r>
+              <a:rPr lang="en-GB" dirty="0" smtClean="0"/>
+              <a:t>Re-specified and improved areas of the systems user interface</a:t>
+            </a:r>
+          </a:p>
+          <a:p>
+            <a:pPr marL="285750" indent="-285750">
+              <a:lnSpc>
+                <a:spcPct val="150000"/>
+              </a:lnSpc>
+              <a:buBlip>
+                <a:blip r:embed="rId3"/>
+              </a:buBlip>
+            </a:pPr>
+            <a:r>
+              <a:rPr lang="en-GB" dirty="0" smtClean="0"/>
+              <a:t>Decreased delivery times of developments and fixes</a:t>
+            </a:r>
+          </a:p>
+          <a:p>
+            <a:pPr marL="285750" indent="-285750">
+              <a:lnSpc>
+                <a:spcPct val="150000"/>
+              </a:lnSpc>
+              <a:buBlip>
+                <a:blip r:embed="rId3"/>
+              </a:buBlip>
+            </a:pPr>
+            <a:r>
+              <a:rPr lang="en-GB" dirty="0" smtClean="0"/>
+              <a:t>Automation of manual tasks</a:t>
+            </a:r>
+          </a:p>
+          <a:p>
+            <a:pPr marL="285750" indent="-285750">
+              <a:lnSpc>
+                <a:spcPct val="150000"/>
+              </a:lnSpc>
+              <a:buBlip>
+                <a:blip r:embed="rId3"/>
+              </a:buBlip>
+            </a:pPr>
+            <a:r>
+              <a:rPr lang="en-GB" dirty="0" smtClean="0"/>
+              <a:t>Documentation of system status</a:t>
+            </a:r>
+          </a:p>
+          <a:p>
+            <a:pPr>
+              <a:lnSpc>
+                <a:spcPct val="150000"/>
+              </a:lnSpc>
+            </a:pPr>
+            <a:endParaRPr lang="en-GB" dirty="0" smtClean="0"/>
+          </a:p>
+          <a:p>
+            <a:pPr marL="285750" indent="-285750">
+              <a:lnSpc>
+                <a:spcPct val="150000"/>
+              </a:lnSpc>
+              <a:buBlip>
+                <a:blip r:embed="rId3"/>
+              </a:buBlip>
+            </a:pPr>
+            <a:endParaRPr lang="en-GB" dirty="0" smtClean="0"/>
+          </a:p>
+          <a:p>
+            <a:endParaRPr lang="en-GB" dirty="0" smtClean="0"/>
+          </a:p>
+          <a:p>
+            <a:endParaRPr lang="en-GB" dirty="0"/>
+          </a:p>
+        </p:txBody>
+      </p:sp>
     </p:spTree>
     <p:extLst>
       <p:ext uri="{BB962C8B-B14F-4D97-AF65-F5344CB8AC3E}">
@@ -5145,6 +5546,346 @@
           </a:p>
         </p:txBody>
       </p:sp>
+      <p:sp>
+        <p:nvSpPr>
+          <p:cNvPr id="3" name="TextBox 2"/>
+          <p:cNvSpPr txBox="1"/>
+          <p:nvPr/>
+        </p:nvSpPr>
+        <p:spPr>
+          <a:xfrm>
+            <a:off x="513807" y="1890277"/>
+            <a:ext cx="4062020" cy="4893647"/>
+          </a:xfrm>
+          <a:prstGeom prst="rect">
+            <a:avLst/>
+          </a:prstGeom>
+          <a:noFill/>
+        </p:spPr>
+        <p:txBody>
+          <a:bodyPr wrap="square" rtlCol="0">
+            <a:spAutoFit/>
+          </a:bodyPr>
+          <a:lstStyle/>
+          <a:p>
+            <a:r>
+              <a:rPr lang="en-GB" sz="2400" dirty="0" smtClean="0"/>
+              <a:t>Skills Developed and Learnt</a:t>
+            </a:r>
+          </a:p>
+          <a:p>
+            <a:endParaRPr lang="en-GB" sz="1600" dirty="0"/>
+          </a:p>
+          <a:p>
+            <a:pPr marL="285750" indent="-285750">
+              <a:lnSpc>
+                <a:spcPct val="150000"/>
+              </a:lnSpc>
+              <a:buBlip>
+                <a:blip r:embed="rId3"/>
+              </a:buBlip>
+            </a:pPr>
+            <a:r>
+              <a:rPr lang="en-GB" dirty="0" smtClean="0"/>
+              <a:t>Documentation and analysis skills</a:t>
+            </a:r>
+          </a:p>
+          <a:p>
+            <a:pPr marL="285750" indent="-285750">
+              <a:lnSpc>
+                <a:spcPct val="150000"/>
+              </a:lnSpc>
+              <a:buBlip>
+                <a:blip r:embed="rId3"/>
+              </a:buBlip>
+            </a:pPr>
+            <a:r>
+              <a:rPr lang="en-GB" dirty="0" smtClean="0"/>
+              <a:t>Presentation and communication skills</a:t>
+            </a:r>
+          </a:p>
+          <a:p>
+            <a:pPr marL="285750" indent="-285750">
+              <a:lnSpc>
+                <a:spcPct val="150000"/>
+              </a:lnSpc>
+              <a:buBlip>
+                <a:blip r:embed="rId3"/>
+              </a:buBlip>
+            </a:pPr>
+            <a:r>
+              <a:rPr lang="en-GB" dirty="0" smtClean="0"/>
+              <a:t>MSRS RDL (Report Definition Language)</a:t>
+            </a:r>
+          </a:p>
+          <a:p>
+            <a:pPr marL="285750" indent="-285750">
+              <a:lnSpc>
+                <a:spcPct val="150000"/>
+              </a:lnSpc>
+              <a:buBlip>
+                <a:blip r:embed="rId3"/>
+              </a:buBlip>
+            </a:pPr>
+            <a:r>
+              <a:rPr lang="en-GB" dirty="0" smtClean="0"/>
+              <a:t>C#</a:t>
+            </a:r>
+          </a:p>
+          <a:p>
+            <a:pPr marL="285750" indent="-285750">
+              <a:lnSpc>
+                <a:spcPct val="150000"/>
+              </a:lnSpc>
+              <a:buBlip>
+                <a:blip r:embed="rId3"/>
+              </a:buBlip>
+            </a:pPr>
+            <a:r>
+              <a:rPr lang="en-GB" dirty="0" smtClean="0"/>
+              <a:t>SQL queries, stored procedures and database integrity</a:t>
+            </a:r>
+          </a:p>
+          <a:p>
+            <a:pPr marL="285750" indent="-285750">
+              <a:lnSpc>
+                <a:spcPct val="150000"/>
+              </a:lnSpc>
+              <a:buBlip>
+                <a:blip r:embed="rId3"/>
+              </a:buBlip>
+            </a:pPr>
+            <a:r>
+              <a:rPr lang="en-GB" dirty="0" smtClean="0"/>
+              <a:t>Versions control software (GIT)</a:t>
+            </a:r>
+          </a:p>
+          <a:p>
+            <a:pPr marL="285750" indent="-285750">
+              <a:buBlip>
+                <a:blip r:embed="rId3"/>
+              </a:buBlip>
+            </a:pPr>
+            <a:endParaRPr lang="en-GB" dirty="0" smtClean="0"/>
+          </a:p>
+          <a:p>
+            <a:pPr marL="285750" indent="-285750">
+              <a:buBlip>
+                <a:blip r:embed="rId3"/>
+              </a:buBlip>
+            </a:pPr>
+            <a:endParaRPr lang="en-GB" dirty="0" smtClean="0"/>
+          </a:p>
+          <a:p>
+            <a:pPr marL="285750" indent="-285750">
+              <a:buBlip>
+                <a:blip r:embed="rId3"/>
+              </a:buBlip>
+            </a:pPr>
+            <a:endParaRPr lang="en-GB" dirty="0"/>
+          </a:p>
+        </p:txBody>
+      </p:sp>
+      <p:sp>
+        <p:nvSpPr>
+          <p:cNvPr id="7" name="TextBox 6"/>
+          <p:cNvSpPr txBox="1"/>
+          <p:nvPr/>
+        </p:nvSpPr>
+        <p:spPr>
+          <a:xfrm>
+            <a:off x="7959137" y="1893626"/>
+            <a:ext cx="3929843" cy="3970318"/>
+          </a:xfrm>
+          <a:prstGeom prst="rect">
+            <a:avLst/>
+          </a:prstGeom>
+          <a:noFill/>
+        </p:spPr>
+        <p:txBody>
+          <a:bodyPr wrap="square" rtlCol="0">
+            <a:spAutoFit/>
+          </a:bodyPr>
+          <a:lstStyle/>
+          <a:p>
+            <a:r>
+              <a:rPr lang="en-GB" sz="2400" dirty="0" smtClean="0"/>
+              <a:t>University Modules that Complimented the Job Role</a:t>
+            </a:r>
+          </a:p>
+          <a:p>
+            <a:endParaRPr lang="en-GB" sz="1600" dirty="0"/>
+          </a:p>
+          <a:p>
+            <a:pPr marL="285750" indent="-285750">
+              <a:lnSpc>
+                <a:spcPct val="150000"/>
+              </a:lnSpc>
+              <a:buBlip>
+                <a:blip r:embed="rId3"/>
+              </a:buBlip>
+            </a:pPr>
+            <a:r>
+              <a:rPr lang="en-GB" dirty="0" smtClean="0"/>
+              <a:t>Databases</a:t>
+            </a:r>
+          </a:p>
+          <a:p>
+            <a:pPr marL="285750" indent="-285750">
+              <a:lnSpc>
+                <a:spcPct val="150000"/>
+              </a:lnSpc>
+              <a:buBlip>
+                <a:blip r:embed="rId3"/>
+              </a:buBlip>
+            </a:pPr>
+            <a:r>
+              <a:rPr lang="en-GB" dirty="0" smtClean="0"/>
+              <a:t>Advanced Databases</a:t>
+            </a:r>
+          </a:p>
+          <a:p>
+            <a:pPr marL="285750" indent="-285750">
+              <a:lnSpc>
+                <a:spcPct val="150000"/>
+              </a:lnSpc>
+              <a:buBlip>
+                <a:blip r:embed="rId3"/>
+              </a:buBlip>
+            </a:pPr>
+            <a:r>
+              <a:rPr lang="en-GB" dirty="0" smtClean="0"/>
+              <a:t>HCI (Human Computer Interaction)</a:t>
+            </a:r>
+          </a:p>
+          <a:p>
+            <a:pPr marL="285750" indent="-285750">
+              <a:lnSpc>
+                <a:spcPct val="150000"/>
+              </a:lnSpc>
+              <a:buBlip>
+                <a:blip r:embed="rId3"/>
+              </a:buBlip>
+            </a:pPr>
+            <a:r>
+              <a:rPr lang="en-GB" dirty="0" smtClean="0"/>
+              <a:t>Software engineering</a:t>
+            </a:r>
+          </a:p>
+          <a:p>
+            <a:pPr marL="285750" indent="-285750">
+              <a:lnSpc>
+                <a:spcPct val="150000"/>
+              </a:lnSpc>
+              <a:buBlip>
+                <a:blip r:embed="rId3"/>
+              </a:buBlip>
+            </a:pPr>
+            <a:r>
+              <a:rPr lang="en-GB" dirty="0" smtClean="0"/>
+              <a:t>Project Management</a:t>
+            </a:r>
+          </a:p>
+          <a:p>
+            <a:pPr marL="285750" indent="-285750">
+              <a:lnSpc>
+                <a:spcPct val="150000"/>
+              </a:lnSpc>
+              <a:buBlip>
+                <a:blip r:embed="rId3"/>
+              </a:buBlip>
+            </a:pPr>
+            <a:r>
+              <a:rPr lang="en-GB" dirty="0" smtClean="0"/>
+              <a:t>Programming</a:t>
+            </a:r>
+          </a:p>
+          <a:p>
+            <a:pPr marL="285750" indent="-285750">
+              <a:buBlip>
+                <a:blip r:embed="rId3"/>
+              </a:buBlip>
+            </a:pPr>
+            <a:endParaRPr lang="en-GB" dirty="0"/>
+          </a:p>
+        </p:txBody>
+      </p:sp>
+      <p:sp>
+        <p:nvSpPr>
+          <p:cNvPr id="8" name="TextBox 7"/>
+          <p:cNvSpPr txBox="1"/>
+          <p:nvPr/>
+        </p:nvSpPr>
+        <p:spPr>
+          <a:xfrm>
+            <a:off x="4811824" y="1893626"/>
+            <a:ext cx="2911315" cy="4154984"/>
+          </a:xfrm>
+          <a:prstGeom prst="rect">
+            <a:avLst/>
+          </a:prstGeom>
+          <a:noFill/>
+        </p:spPr>
+        <p:txBody>
+          <a:bodyPr wrap="square" rtlCol="0">
+            <a:spAutoFit/>
+          </a:bodyPr>
+          <a:lstStyle/>
+          <a:p>
+            <a:r>
+              <a:rPr lang="en-GB" sz="2400" dirty="0" smtClean="0"/>
+              <a:t>Business Aspects</a:t>
+            </a:r>
+          </a:p>
+          <a:p>
+            <a:endParaRPr lang="en-GB" sz="2400" dirty="0"/>
+          </a:p>
+          <a:p>
+            <a:pPr marL="342900" indent="-342900">
+              <a:buBlip>
+                <a:blip r:embed="rId3"/>
+              </a:buBlip>
+            </a:pPr>
+            <a:r>
+              <a:rPr lang="en-GB" dirty="0" smtClean="0"/>
+              <a:t>The importance of data protection handling sensitive data</a:t>
+            </a:r>
+          </a:p>
+          <a:p>
+            <a:pPr marL="342900" indent="-342900">
+              <a:buBlip>
+                <a:blip r:embed="rId3"/>
+              </a:buBlip>
+            </a:pPr>
+            <a:r>
+              <a:rPr lang="en-GB" dirty="0" smtClean="0"/>
+              <a:t>Changes to internet product standards and its effect within a business</a:t>
+            </a:r>
+          </a:p>
+          <a:p>
+            <a:pPr marL="342900" indent="-342900">
+              <a:buBlip>
+                <a:blip r:embed="rId3"/>
+              </a:buBlip>
+            </a:pPr>
+            <a:r>
+              <a:rPr lang="en-GB" dirty="0" smtClean="0"/>
+              <a:t>The management and deliverance of software solutions (Software Life Cycle)</a:t>
+            </a:r>
+          </a:p>
+          <a:p>
+            <a:pPr marL="342900" indent="-342900">
+              <a:buBlip>
+                <a:blip r:embed="rId3"/>
+              </a:buBlip>
+            </a:pPr>
+            <a:r>
+              <a:rPr lang="en-GB" dirty="0" smtClean="0"/>
+              <a:t>The realism of software specifications</a:t>
+            </a:r>
+          </a:p>
+        </p:txBody>
+      </p:sp>
     </p:spTree>
     <p:extLst>
       <p:ext uri="{BB962C8B-B14F-4D97-AF65-F5344CB8AC3E}">
@@ -5339,6 +6080,199 @@
           <a:lstStyle/>
           <a:p>
             <a:endParaRPr lang="en-GB"/>
+          </a:p>
+        </p:txBody>
+      </p:sp>
+      <p:sp>
+        <p:nvSpPr>
+          <p:cNvPr id="3" name="TextBox 2"/>
+          <p:cNvSpPr txBox="1"/>
+          <p:nvPr/>
+        </p:nvSpPr>
+        <p:spPr>
+          <a:xfrm>
+            <a:off x="709683" y="1773307"/>
+            <a:ext cx="4995082" cy="4339650"/>
+          </a:xfrm>
+          <a:prstGeom prst="rect">
+            <a:avLst/>
+          </a:prstGeom>
+          <a:noFill/>
+        </p:spPr>
+        <p:txBody>
+          <a:bodyPr wrap="square" rtlCol="0">
+            <a:spAutoFit/>
+          </a:bodyPr>
+          <a:lstStyle/>
+          <a:p>
+            <a:r>
+              <a:rPr lang="en-GB" sz="2400" dirty="0" smtClean="0"/>
+              <a:t>Negatives:</a:t>
+            </a:r>
+          </a:p>
+          <a:p>
+            <a:endParaRPr lang="en-GB" dirty="0"/>
+          </a:p>
+          <a:p>
+            <a:pPr marL="285750" indent="-285750">
+              <a:lnSpc>
+                <a:spcPct val="150000"/>
+              </a:lnSpc>
+              <a:buBlip>
+                <a:blip r:embed="rId3"/>
+              </a:buBlip>
+            </a:pPr>
+            <a:r>
+              <a:rPr lang="en-GB" dirty="0" smtClean="0"/>
+              <a:t>Foundations of the system were built with legacy code classic.asp</a:t>
+            </a:r>
+          </a:p>
+          <a:p>
+            <a:pPr marL="285750" indent="-285750">
+              <a:lnSpc>
+                <a:spcPct val="150000"/>
+              </a:lnSpc>
+              <a:buBlip>
+                <a:blip r:embed="rId3"/>
+              </a:buBlip>
+            </a:pPr>
+            <a:r>
+              <a:rPr lang="en-GB" dirty="0"/>
+              <a:t>H</a:t>
+            </a:r>
+            <a:r>
+              <a:rPr lang="en-GB" dirty="0" smtClean="0"/>
+              <a:t>ard to get another developers time for help at times</a:t>
+            </a:r>
+          </a:p>
+          <a:p>
+            <a:pPr marL="285750" indent="-285750">
+              <a:lnSpc>
+                <a:spcPct val="150000"/>
+              </a:lnSpc>
+              <a:buBlip>
+                <a:blip r:embed="rId3"/>
+              </a:buBlip>
+            </a:pPr>
+            <a:r>
+              <a:rPr lang="en-GB" dirty="0" smtClean="0"/>
+              <a:t>Large turn around in staff just previous before my arrival at </a:t>
+            </a:r>
+            <a:r>
+              <a:rPr lang="en-GB" dirty="0" err="1" smtClean="0"/>
+              <a:t>Indicater</a:t>
+            </a:r>
+            <a:endParaRPr lang="en-GB" dirty="0" smtClean="0"/>
+          </a:p>
+          <a:p>
+            <a:pPr marL="285750" indent="-285750">
+              <a:lnSpc>
+                <a:spcPct val="150000"/>
+              </a:lnSpc>
+              <a:buBlip>
+                <a:blip r:embed="rId3"/>
+              </a:buBlip>
+            </a:pPr>
+            <a:r>
+              <a:rPr lang="en-GB" dirty="0" smtClean="0"/>
+              <a:t>Areas of system documentation was unclear and in some cases non existent</a:t>
+            </a:r>
+          </a:p>
+          <a:p>
+            <a:pPr marL="285750" indent="-285750">
+              <a:buBlip>
+                <a:blip r:embed="rId3"/>
+              </a:buBlip>
+            </a:pPr>
+            <a:endParaRPr lang="en-GB" dirty="0"/>
+          </a:p>
+        </p:txBody>
+      </p:sp>
+      <p:sp>
+        <p:nvSpPr>
+          <p:cNvPr id="7" name="TextBox 6"/>
+          <p:cNvSpPr txBox="1"/>
+          <p:nvPr/>
+        </p:nvSpPr>
+        <p:spPr>
+          <a:xfrm>
+            <a:off x="5704765" y="1773307"/>
+            <a:ext cx="5840364" cy="3970318"/>
+          </a:xfrm>
+          <a:prstGeom prst="rect">
+            <a:avLst/>
+          </a:prstGeom>
+          <a:noFill/>
+        </p:spPr>
+        <p:txBody>
+          <a:bodyPr wrap="square" rtlCol="0">
+            <a:spAutoFit/>
+          </a:bodyPr>
+          <a:lstStyle/>
+          <a:p>
+            <a:r>
+              <a:rPr lang="en-GB" sz="2400" dirty="0" smtClean="0"/>
+              <a:t>Positives:</a:t>
+            </a:r>
+          </a:p>
+          <a:p>
+            <a:endParaRPr lang="en-GB" sz="1200" dirty="0" smtClean="0"/>
+          </a:p>
+          <a:p>
+            <a:pPr marL="285750" indent="-285750">
+              <a:lnSpc>
+                <a:spcPct val="150000"/>
+              </a:lnSpc>
+              <a:buBlip>
+                <a:blip r:embed="rId3"/>
+              </a:buBlip>
+            </a:pPr>
+            <a:r>
+              <a:rPr lang="en-GB" dirty="0" smtClean="0"/>
+              <a:t>High level or permissions granted access to important areas of the system</a:t>
+            </a:r>
+          </a:p>
+          <a:p>
+            <a:pPr marL="285750" indent="-285750">
+              <a:lnSpc>
+                <a:spcPct val="150000"/>
+              </a:lnSpc>
+              <a:buBlip>
+                <a:blip r:embed="rId3"/>
+              </a:buBlip>
+            </a:pPr>
+            <a:r>
+              <a:rPr lang="en-GB" dirty="0" smtClean="0"/>
+              <a:t>Included important meetings and discussions. Encouraged to voice opinions </a:t>
+            </a:r>
+          </a:p>
+          <a:p>
+            <a:pPr marL="285750" indent="-285750">
+              <a:lnSpc>
+                <a:spcPct val="150000"/>
+              </a:lnSpc>
+              <a:buBlip>
+                <a:blip r:embed="rId3"/>
+              </a:buBlip>
+            </a:pPr>
+            <a:r>
+              <a:rPr lang="en-GB" dirty="0" smtClean="0"/>
+              <a:t>Working in a small team provided exposure to many areas of the system.</a:t>
+            </a:r>
+          </a:p>
+          <a:p>
+            <a:pPr marL="285750" indent="-285750">
+              <a:lnSpc>
+                <a:spcPct val="150000"/>
+              </a:lnSpc>
+              <a:buBlip>
+                <a:blip r:embed="rId3"/>
+              </a:buBlip>
+            </a:pPr>
+            <a:r>
+              <a:rPr lang="en-GB" dirty="0" smtClean="0"/>
+              <a:t>Working with technologies and software that has further developed my technical skills and learnt new ones.</a:t>
+            </a:r>
           </a:p>
         </p:txBody>
       </p:sp>
@@ -5610,7 +6544,7 @@
   <a:extraClrSchemeLst/>
   <a:extLst>
     <a:ext uri="{05A4C25C-085E-4340-85A3-A5531E510DB2}">
-      <thm15:themeFamily xmlns="" xmlns:thm15="http://schemas.microsoft.com/office/thememl/2012/main" name="Office Theme" id="{62F939B6-93AF-4DB8-9C6B-D6C7DFDC589F}" vid="{4A3C46E8-61CC-4603-A589-7422A47A8E4A}"/>
+      <thm15:themeFamily xmlns:thm15="http://schemas.microsoft.com/office/thememl/2012/main" name="Office Theme" id="{62F939B6-93AF-4DB8-9C6B-D6C7DFDC589F}" vid="{4A3C46E8-61CC-4603-A589-7422A47A8E4A}"/>
     </a:ext>
   </a:extLst>
 </a:theme>

</xml_diff>